<commit_message>
Lisp encoding of Contrapuctus VI, ContrapunctusVI-002.lisp completed.
</commit_message>
<xml_diff>
--- a/BachJS/DieKunstDerFuge/ContrapunctusVI/ContrapunctusVI.pptx
+++ b/BachJS/DieKunstDerFuge/ContrapunctusVI/ContrapunctusVI.pptx
@@ -113,6 +113,22 @@
       </a:defRPr>
     </a:lvl9pPr>
   </p:defaultTextStyle>
+  <p:extLst>
+    <p:ext uri="{EFAFB233-063F-42B5-8137-9DF3F51BA10A}">
+      <p15:sldGuideLst xmlns:p15="http://schemas.microsoft.com/office/powerpoint/2012/main">
+        <p15:guide id="1" orient="horz" pos="3120">
+          <p15:clr>
+            <a:srgbClr val="A4A3A4"/>
+          </p15:clr>
+        </p15:guide>
+        <p15:guide id="2" pos="2160">
+          <p15:clr>
+            <a:srgbClr val="A4A3A4"/>
+          </p15:clr>
+        </p15:guide>
+      </p15:sldGuideLst>
+    </p:ext>
+  </p:extLst>
 </p:presentation>
 </file>
 
@@ -296,7 +312,7 @@
           <a:lstStyle/>
           <a:p>
             <a:fld id="{BE0334A5-8AF0-EA42-BAFC-E7203C046F87}" type="datetimeFigureOut">
-              <a:t>11/03/15</a:t>
+              <a:t>4/19/23</a:t>
             </a:fld>
             <a:endParaRPr lang="en-US"/>
           </a:p>
@@ -464,7 +480,7 @@
           <a:lstStyle/>
           <a:p>
             <a:fld id="{BE0334A5-8AF0-EA42-BAFC-E7203C046F87}" type="datetimeFigureOut">
-              <a:t>11/03/15</a:t>
+              <a:t>4/19/23</a:t>
             </a:fld>
             <a:endParaRPr lang="en-US"/>
           </a:p>
@@ -642,7 +658,7 @@
           <a:lstStyle/>
           <a:p>
             <a:fld id="{BE0334A5-8AF0-EA42-BAFC-E7203C046F87}" type="datetimeFigureOut">
-              <a:t>11/03/15</a:t>
+              <a:t>4/19/23</a:t>
             </a:fld>
             <a:endParaRPr lang="en-US"/>
           </a:p>
@@ -810,7 +826,7 @@
           <a:lstStyle/>
           <a:p>
             <a:fld id="{BE0334A5-8AF0-EA42-BAFC-E7203C046F87}" type="datetimeFigureOut">
-              <a:t>11/03/15</a:t>
+              <a:t>4/19/23</a:t>
             </a:fld>
             <a:endParaRPr lang="en-US"/>
           </a:p>
@@ -1054,7 +1070,7 @@
           <a:lstStyle/>
           <a:p>
             <a:fld id="{BE0334A5-8AF0-EA42-BAFC-E7203C046F87}" type="datetimeFigureOut">
-              <a:t>11/03/15</a:t>
+              <a:t>4/19/23</a:t>
             </a:fld>
             <a:endParaRPr lang="en-US"/>
           </a:p>
@@ -1340,7 +1356,7 @@
           <a:lstStyle/>
           <a:p>
             <a:fld id="{BE0334A5-8AF0-EA42-BAFC-E7203C046F87}" type="datetimeFigureOut">
-              <a:t>11/03/15</a:t>
+              <a:t>4/19/23</a:t>
             </a:fld>
             <a:endParaRPr lang="en-US"/>
           </a:p>
@@ -1765,7 +1781,7 @@
           <a:lstStyle/>
           <a:p>
             <a:fld id="{BE0334A5-8AF0-EA42-BAFC-E7203C046F87}" type="datetimeFigureOut">
-              <a:t>11/03/15</a:t>
+              <a:t>4/19/23</a:t>
             </a:fld>
             <a:endParaRPr lang="en-US"/>
           </a:p>
@@ -1881,7 +1897,7 @@
           <a:lstStyle/>
           <a:p>
             <a:fld id="{BE0334A5-8AF0-EA42-BAFC-E7203C046F87}" type="datetimeFigureOut">
-              <a:t>11/03/15</a:t>
+              <a:t>4/19/23</a:t>
             </a:fld>
             <a:endParaRPr lang="en-US"/>
           </a:p>
@@ -1974,7 +1990,7 @@
           <a:lstStyle/>
           <a:p>
             <a:fld id="{BE0334A5-8AF0-EA42-BAFC-E7203C046F87}" type="datetimeFigureOut">
-              <a:t>11/03/15</a:t>
+              <a:t>4/19/23</a:t>
             </a:fld>
             <a:endParaRPr lang="en-US"/>
           </a:p>
@@ -2249,7 +2265,7 @@
           <a:lstStyle/>
           <a:p>
             <a:fld id="{BE0334A5-8AF0-EA42-BAFC-E7203C046F87}" type="datetimeFigureOut">
-              <a:t>11/03/15</a:t>
+              <a:t>4/19/23</a:t>
             </a:fld>
             <a:endParaRPr lang="en-US"/>
           </a:p>
@@ -2500,7 +2516,7 @@
           <a:lstStyle/>
           <a:p>
             <a:fld id="{BE0334A5-8AF0-EA42-BAFC-E7203C046F87}" type="datetimeFigureOut">
-              <a:t>11/03/15</a:t>
+              <a:t>4/19/23</a:t>
             </a:fld>
             <a:endParaRPr lang="en-US"/>
           </a:p>
@@ -2711,7 +2727,7 @@
           </a:lstStyle>
           <a:p>
             <a:fld id="{BE0334A5-8AF0-EA42-BAFC-E7203C046F87}" type="datetimeFigureOut">
-              <a:t>11/03/15</a:t>
+              <a:t>4/19/23</a:t>
             </a:fld>
             <a:endParaRPr lang="en-US"/>
           </a:p>
@@ -5266,6 +5282,216 @@
           <a:p>
             <a:pPr algn="ctr"/>
             <a:endParaRPr lang="en-US"/>
+          </a:p>
+        </p:txBody>
+      </p:sp>
+      <p:sp>
+        <p:nvSpPr>
+          <p:cNvPr id="2" name="TextBox 1">
+            <a:extLst>
+              <a:ext uri="{FF2B5EF4-FFF2-40B4-BE49-F238E27FC236}">
+                <a16:creationId xmlns:a16="http://schemas.microsoft.com/office/drawing/2014/main" id="{3037656D-6F3A-6324-79D4-E6D9F2DABC44}"/>
+              </a:ext>
+            </a:extLst>
+          </p:cNvPr>
+          <p:cNvSpPr txBox="1"/>
+          <p:nvPr/>
+        </p:nvSpPr>
+        <p:spPr>
+          <a:xfrm>
+            <a:off x="2490694" y="519106"/>
+            <a:ext cx="276038" cy="307777"/>
+          </a:xfrm>
+          <a:prstGeom prst="rect">
+            <a:avLst/>
+          </a:prstGeom>
+          <a:noFill/>
+        </p:spPr>
+        <p:txBody>
+          <a:bodyPr wrap="none" rtlCol="0">
+            <a:spAutoFit/>
+          </a:bodyPr>
+          <a:lstStyle/>
+          <a:p>
+            <a:r>
+              <a:rPr lang="en-US" sz="1400"/>
+              <a:t>2</a:t>
+            </a:r>
+          </a:p>
+        </p:txBody>
+      </p:sp>
+      <p:sp>
+        <p:nvSpPr>
+          <p:cNvPr id="3" name="TextBox 2">
+            <a:extLst>
+              <a:ext uri="{FF2B5EF4-FFF2-40B4-BE49-F238E27FC236}">
+                <a16:creationId xmlns:a16="http://schemas.microsoft.com/office/drawing/2014/main" id="{4B414BD2-D572-C0A2-73B6-213395D169FD}"/>
+              </a:ext>
+            </a:extLst>
+          </p:cNvPr>
+          <p:cNvSpPr txBox="1"/>
+          <p:nvPr/>
+        </p:nvSpPr>
+        <p:spPr>
+          <a:xfrm>
+            <a:off x="1357633" y="2182250"/>
+            <a:ext cx="276038" cy="307777"/>
+          </a:xfrm>
+          <a:prstGeom prst="rect">
+            <a:avLst/>
+          </a:prstGeom>
+          <a:noFill/>
+        </p:spPr>
+        <p:txBody>
+          <a:bodyPr wrap="none" rtlCol="0">
+            <a:spAutoFit/>
+          </a:bodyPr>
+          <a:lstStyle/>
+          <a:p>
+            <a:r>
+              <a:rPr lang="en-US" sz="1400"/>
+              <a:t>1</a:t>
+            </a:r>
+          </a:p>
+        </p:txBody>
+      </p:sp>
+      <p:sp>
+        <p:nvSpPr>
+          <p:cNvPr id="16" name="TextBox 15">
+            <a:extLst>
+              <a:ext uri="{FF2B5EF4-FFF2-40B4-BE49-F238E27FC236}">
+                <a16:creationId xmlns:a16="http://schemas.microsoft.com/office/drawing/2014/main" id="{922C8168-B97C-8280-7371-E94132522D5C}"/>
+              </a:ext>
+            </a:extLst>
+          </p:cNvPr>
+          <p:cNvSpPr txBox="1"/>
+          <p:nvPr/>
+        </p:nvSpPr>
+        <p:spPr>
+          <a:xfrm>
+            <a:off x="5376870" y="1109544"/>
+            <a:ext cx="276038" cy="307777"/>
+          </a:xfrm>
+          <a:prstGeom prst="rect">
+            <a:avLst/>
+          </a:prstGeom>
+          <a:noFill/>
+        </p:spPr>
+        <p:txBody>
+          <a:bodyPr wrap="none" rtlCol="0">
+            <a:spAutoFit/>
+          </a:bodyPr>
+          <a:lstStyle/>
+          <a:p>
+            <a:r>
+              <a:rPr lang="en-US" sz="1400"/>
+              <a:t>3</a:t>
+            </a:r>
+          </a:p>
+        </p:txBody>
+      </p:sp>
+      <p:sp>
+        <p:nvSpPr>
+          <p:cNvPr id="33" name="TextBox 32">
+            <a:extLst>
+              <a:ext uri="{FF2B5EF4-FFF2-40B4-BE49-F238E27FC236}">
+                <a16:creationId xmlns:a16="http://schemas.microsoft.com/office/drawing/2014/main" id="{70FDA3AB-9C30-611E-3D82-5790BDC206EC}"/>
+              </a:ext>
+            </a:extLst>
+          </p:cNvPr>
+          <p:cNvSpPr txBox="1"/>
+          <p:nvPr/>
+        </p:nvSpPr>
+        <p:spPr>
+          <a:xfrm>
+            <a:off x="3687840" y="6381382"/>
+            <a:ext cx="276038" cy="307777"/>
+          </a:xfrm>
+          <a:prstGeom prst="rect">
+            <a:avLst/>
+          </a:prstGeom>
+          <a:noFill/>
+        </p:spPr>
+        <p:txBody>
+          <a:bodyPr wrap="none" rtlCol="0">
+            <a:spAutoFit/>
+          </a:bodyPr>
+          <a:lstStyle/>
+          <a:p>
+            <a:r>
+              <a:rPr lang="en-US" sz="1400"/>
+              <a:t>4</a:t>
+            </a:r>
+          </a:p>
+        </p:txBody>
+      </p:sp>
+      <p:sp>
+        <p:nvSpPr>
+          <p:cNvPr id="43" name="TextBox 42">
+            <a:extLst>
+              <a:ext uri="{FF2B5EF4-FFF2-40B4-BE49-F238E27FC236}">
+                <a16:creationId xmlns:a16="http://schemas.microsoft.com/office/drawing/2014/main" id="{96CC3A3D-00D5-50AD-A5FC-89A01EDB3D14}"/>
+              </a:ext>
+            </a:extLst>
+          </p:cNvPr>
+          <p:cNvSpPr txBox="1"/>
+          <p:nvPr/>
+        </p:nvSpPr>
+        <p:spPr>
+          <a:xfrm>
+            <a:off x="854890" y="8244604"/>
+            <a:ext cx="276038" cy="307777"/>
+          </a:xfrm>
+          <a:prstGeom prst="rect">
+            <a:avLst/>
+          </a:prstGeom>
+          <a:noFill/>
+        </p:spPr>
+        <p:txBody>
+          <a:bodyPr wrap="none" rtlCol="0">
+            <a:spAutoFit/>
+          </a:bodyPr>
+          <a:lstStyle/>
+          <a:p>
+            <a:r>
+              <a:rPr lang="en-US" sz="1400"/>
+              <a:t>5</a:t>
+            </a:r>
+          </a:p>
+        </p:txBody>
+      </p:sp>
+      <p:sp>
+        <p:nvSpPr>
+          <p:cNvPr id="44" name="TextBox 43">
+            <a:extLst>
+              <a:ext uri="{FF2B5EF4-FFF2-40B4-BE49-F238E27FC236}">
+                <a16:creationId xmlns:a16="http://schemas.microsoft.com/office/drawing/2014/main" id="{69F3C909-B3DE-04A7-2263-24B21A0825EE}"/>
+              </a:ext>
+            </a:extLst>
+          </p:cNvPr>
+          <p:cNvSpPr txBox="1"/>
+          <p:nvPr/>
+        </p:nvSpPr>
+        <p:spPr>
+          <a:xfrm>
+            <a:off x="5708237" y="7689331"/>
+            <a:ext cx="276038" cy="307777"/>
+          </a:xfrm>
+          <a:prstGeom prst="rect">
+            <a:avLst/>
+          </a:prstGeom>
+          <a:noFill/>
+        </p:spPr>
+        <p:txBody>
+          <a:bodyPr wrap="none" rtlCol="0">
+            <a:spAutoFit/>
+          </a:bodyPr>
+          <a:lstStyle/>
+          <a:p>
+            <a:r>
+              <a:rPr lang="en-US" sz="1400"/>
+              <a:t>6</a:t>
+            </a:r>
           </a:p>
         </p:txBody>
       </p:sp>
@@ -8126,6 +8352,111 @@
           </a:p>
         </p:txBody>
       </p:sp>
+      <p:sp>
+        <p:nvSpPr>
+          <p:cNvPr id="2" name="TextBox 1">
+            <a:extLst>
+              <a:ext uri="{FF2B5EF4-FFF2-40B4-BE49-F238E27FC236}">
+                <a16:creationId xmlns:a16="http://schemas.microsoft.com/office/drawing/2014/main" id="{DFA97F40-647A-E47C-C677-A01C588B142C}"/>
+              </a:ext>
+            </a:extLst>
+          </p:cNvPr>
+          <p:cNvSpPr txBox="1"/>
+          <p:nvPr/>
+        </p:nvSpPr>
+        <p:spPr>
+          <a:xfrm>
+            <a:off x="2071673" y="1578175"/>
+            <a:ext cx="367408" cy="307777"/>
+          </a:xfrm>
+          <a:prstGeom prst="rect">
+            <a:avLst/>
+          </a:prstGeom>
+          <a:noFill/>
+        </p:spPr>
+        <p:txBody>
+          <a:bodyPr wrap="none" rtlCol="0">
+            <a:spAutoFit/>
+          </a:bodyPr>
+          <a:lstStyle/>
+          <a:p>
+            <a:r>
+              <a:rPr lang="en-US" sz="1400"/>
+              <a:t>27</a:t>
+            </a:r>
+          </a:p>
+        </p:txBody>
+      </p:sp>
+      <p:sp>
+        <p:nvSpPr>
+          <p:cNvPr id="3" name="TextBox 2">
+            <a:extLst>
+              <a:ext uri="{FF2B5EF4-FFF2-40B4-BE49-F238E27FC236}">
+                <a16:creationId xmlns:a16="http://schemas.microsoft.com/office/drawing/2014/main" id="{C4FD5889-C06B-D706-D3BD-6B6157082410}"/>
+              </a:ext>
+            </a:extLst>
+          </p:cNvPr>
+          <p:cNvSpPr txBox="1"/>
+          <p:nvPr/>
+        </p:nvSpPr>
+        <p:spPr>
+          <a:xfrm>
+            <a:off x="4769269" y="569678"/>
+            <a:ext cx="367408" cy="307777"/>
+          </a:xfrm>
+          <a:prstGeom prst="rect">
+            <a:avLst/>
+          </a:prstGeom>
+          <a:noFill/>
+        </p:spPr>
+        <p:txBody>
+          <a:bodyPr wrap="none" rtlCol="0">
+            <a:spAutoFit/>
+          </a:bodyPr>
+          <a:lstStyle/>
+          <a:p>
+            <a:r>
+              <a:rPr lang="en-US" sz="1400"/>
+              <a:t>28</a:t>
+            </a:r>
+          </a:p>
+        </p:txBody>
+      </p:sp>
+      <p:sp>
+        <p:nvSpPr>
+          <p:cNvPr id="15" name="TextBox 14">
+            <a:extLst>
+              <a:ext uri="{FF2B5EF4-FFF2-40B4-BE49-F238E27FC236}">
+                <a16:creationId xmlns:a16="http://schemas.microsoft.com/office/drawing/2014/main" id="{BFC7C545-04FD-0DD6-7E15-9BCE416AE16A}"/>
+              </a:ext>
+            </a:extLst>
+          </p:cNvPr>
+          <p:cNvSpPr txBox="1"/>
+          <p:nvPr/>
+        </p:nvSpPr>
+        <p:spPr>
+          <a:xfrm>
+            <a:off x="2387450" y="3522024"/>
+            <a:ext cx="367408" cy="307777"/>
+          </a:xfrm>
+          <a:prstGeom prst="rect">
+            <a:avLst/>
+          </a:prstGeom>
+          <a:noFill/>
+        </p:spPr>
+        <p:txBody>
+          <a:bodyPr wrap="none" rtlCol="0">
+            <a:spAutoFit/>
+          </a:bodyPr>
+          <a:lstStyle/>
+          <a:p>
+            <a:r>
+              <a:rPr lang="en-US" sz="1400"/>
+              <a:t>29</a:t>
+            </a:r>
+          </a:p>
+        </p:txBody>
+      </p:sp>
     </p:spTree>
     <p:extLst>
       <p:ext uri="{BB962C8B-B14F-4D97-AF65-F5344CB8AC3E}">
@@ -10580,6 +10911,111 @@
           </a:p>
         </p:txBody>
       </p:sp>
+      <p:sp>
+        <p:nvSpPr>
+          <p:cNvPr id="2" name="TextBox 1">
+            <a:extLst>
+              <a:ext uri="{FF2B5EF4-FFF2-40B4-BE49-F238E27FC236}">
+                <a16:creationId xmlns:a16="http://schemas.microsoft.com/office/drawing/2014/main" id="{83CBB7D9-7DE6-992F-2DF4-E339E17C97C7}"/>
+              </a:ext>
+            </a:extLst>
+          </p:cNvPr>
+          <p:cNvSpPr txBox="1"/>
+          <p:nvPr/>
+        </p:nvSpPr>
+        <p:spPr>
+          <a:xfrm>
+            <a:off x="732510" y="7031280"/>
+            <a:ext cx="276038" cy="307777"/>
+          </a:xfrm>
+          <a:prstGeom prst="rect">
+            <a:avLst/>
+          </a:prstGeom>
+          <a:noFill/>
+        </p:spPr>
+        <p:txBody>
+          <a:bodyPr wrap="none" rtlCol="0">
+            <a:spAutoFit/>
+          </a:bodyPr>
+          <a:lstStyle/>
+          <a:p>
+            <a:r>
+              <a:rPr lang="en-US" sz="1400"/>
+              <a:t>7</a:t>
+            </a:r>
+          </a:p>
+        </p:txBody>
+      </p:sp>
+      <p:sp>
+        <p:nvSpPr>
+          <p:cNvPr id="3" name="TextBox 2">
+            <a:extLst>
+              <a:ext uri="{FF2B5EF4-FFF2-40B4-BE49-F238E27FC236}">
+                <a16:creationId xmlns:a16="http://schemas.microsoft.com/office/drawing/2014/main" id="{E69BAEF4-9942-0AB9-0BC5-00FB2646A85B}"/>
+              </a:ext>
+            </a:extLst>
+          </p:cNvPr>
+          <p:cNvSpPr txBox="1"/>
+          <p:nvPr/>
+        </p:nvSpPr>
+        <p:spPr>
+          <a:xfrm>
+            <a:off x="3568571" y="6103088"/>
+            <a:ext cx="276038" cy="307777"/>
+          </a:xfrm>
+          <a:prstGeom prst="rect">
+            <a:avLst/>
+          </a:prstGeom>
+          <a:noFill/>
+        </p:spPr>
+        <p:txBody>
+          <a:bodyPr wrap="none" rtlCol="0">
+            <a:spAutoFit/>
+          </a:bodyPr>
+          <a:lstStyle/>
+          <a:p>
+            <a:r>
+              <a:rPr lang="en-US" sz="1400"/>
+              <a:t>8</a:t>
+            </a:r>
+          </a:p>
+        </p:txBody>
+      </p:sp>
+      <p:sp>
+        <p:nvSpPr>
+          <p:cNvPr id="10" name="TextBox 9">
+            <a:extLst>
+              <a:ext uri="{FF2B5EF4-FFF2-40B4-BE49-F238E27FC236}">
+                <a16:creationId xmlns:a16="http://schemas.microsoft.com/office/drawing/2014/main" id="{8BB330D5-45EB-5689-7B65-97B34A549D99}"/>
+              </a:ext>
+            </a:extLst>
+          </p:cNvPr>
+          <p:cNvSpPr txBox="1"/>
+          <p:nvPr/>
+        </p:nvSpPr>
+        <p:spPr>
+          <a:xfrm>
+            <a:off x="4924399" y="5308689"/>
+            <a:ext cx="276038" cy="307777"/>
+          </a:xfrm>
+          <a:prstGeom prst="rect">
+            <a:avLst/>
+          </a:prstGeom>
+          <a:noFill/>
+        </p:spPr>
+        <p:txBody>
+          <a:bodyPr wrap="none" rtlCol="0">
+            <a:spAutoFit/>
+          </a:bodyPr>
+          <a:lstStyle/>
+          <a:p>
+            <a:r>
+              <a:rPr lang="en-US" sz="1400"/>
+              <a:t>9</a:t>
+            </a:r>
+          </a:p>
+        </p:txBody>
+      </p:sp>
     </p:spTree>
     <p:extLst>
       <p:ext uri="{BB962C8B-B14F-4D97-AF65-F5344CB8AC3E}">
@@ -10702,8 +11138,8 @@
         </p:nvSpPr>
         <p:spPr>
           <a:xfrm>
-            <a:off x="5047672" y="1431636"/>
-            <a:ext cx="1567873" cy="475127"/>
+            <a:off x="4851400" y="1431636"/>
+            <a:ext cx="1764145" cy="475127"/>
           </a:xfrm>
           <a:prstGeom prst="roundRect">
             <a:avLst/>
@@ -12611,6 +13047,111 @@
           <a:p>
             <a:pPr algn="ctr"/>
             <a:endParaRPr lang="en-US"/>
+          </a:p>
+        </p:txBody>
+      </p:sp>
+      <p:sp>
+        <p:nvSpPr>
+          <p:cNvPr id="2" name="TextBox 1">
+            <a:extLst>
+              <a:ext uri="{FF2B5EF4-FFF2-40B4-BE49-F238E27FC236}">
+                <a16:creationId xmlns:a16="http://schemas.microsoft.com/office/drawing/2014/main" id="{0F67F2C7-245C-94B6-B914-8E8FE7976467}"/>
+              </a:ext>
+            </a:extLst>
+          </p:cNvPr>
+          <p:cNvSpPr txBox="1"/>
+          <p:nvPr/>
+        </p:nvSpPr>
+        <p:spPr>
+          <a:xfrm>
+            <a:off x="5084933" y="1657535"/>
+            <a:ext cx="367408" cy="307777"/>
+          </a:xfrm>
+          <a:prstGeom prst="rect">
+            <a:avLst/>
+          </a:prstGeom>
+          <a:noFill/>
+        </p:spPr>
+        <p:txBody>
+          <a:bodyPr wrap="none" rtlCol="0">
+            <a:spAutoFit/>
+          </a:bodyPr>
+          <a:lstStyle/>
+          <a:p>
+            <a:r>
+              <a:rPr lang="en-US" sz="1400"/>
+              <a:t>10</a:t>
+            </a:r>
+          </a:p>
+        </p:txBody>
+      </p:sp>
+      <p:sp>
+        <p:nvSpPr>
+          <p:cNvPr id="3" name="TextBox 2">
+            <a:extLst>
+              <a:ext uri="{FF2B5EF4-FFF2-40B4-BE49-F238E27FC236}">
+                <a16:creationId xmlns:a16="http://schemas.microsoft.com/office/drawing/2014/main" id="{D38B2EB4-FA90-1DCF-02A1-96B3E176605B}"/>
+              </a:ext>
+            </a:extLst>
+          </p:cNvPr>
+          <p:cNvSpPr txBox="1"/>
+          <p:nvPr/>
+        </p:nvSpPr>
+        <p:spPr>
+          <a:xfrm>
+            <a:off x="855954" y="8246099"/>
+            <a:ext cx="367408" cy="307777"/>
+          </a:xfrm>
+          <a:prstGeom prst="rect">
+            <a:avLst/>
+          </a:prstGeom>
+          <a:noFill/>
+        </p:spPr>
+        <p:txBody>
+          <a:bodyPr wrap="none" rtlCol="0">
+            <a:spAutoFit/>
+          </a:bodyPr>
+          <a:lstStyle/>
+          <a:p>
+            <a:r>
+              <a:rPr lang="en-US" sz="1400"/>
+              <a:t>11</a:t>
+            </a:r>
+          </a:p>
+        </p:txBody>
+      </p:sp>
+      <p:sp>
+        <p:nvSpPr>
+          <p:cNvPr id="29" name="TextBox 28">
+            <a:extLst>
+              <a:ext uri="{FF2B5EF4-FFF2-40B4-BE49-F238E27FC236}">
+                <a16:creationId xmlns:a16="http://schemas.microsoft.com/office/drawing/2014/main" id="{480E7771-FFCA-4D04-F7AA-8C403C3A0261}"/>
+              </a:ext>
+            </a:extLst>
+          </p:cNvPr>
+          <p:cNvSpPr txBox="1"/>
+          <p:nvPr/>
+        </p:nvSpPr>
+        <p:spPr>
+          <a:xfrm>
+            <a:off x="3619226" y="8762527"/>
+            <a:ext cx="367408" cy="307777"/>
+          </a:xfrm>
+          <a:prstGeom prst="rect">
+            <a:avLst/>
+          </a:prstGeom>
+          <a:noFill/>
+        </p:spPr>
+        <p:txBody>
+          <a:bodyPr wrap="none" rtlCol="0">
+            <a:spAutoFit/>
+          </a:bodyPr>
+          <a:lstStyle/>
+          <a:p>
+            <a:r>
+              <a:rPr lang="en-US" sz="1400"/>
+              <a:t>12</a:t>
+            </a:r>
           </a:p>
         </p:txBody>
       </p:sp>
@@ -14408,6 +14949,76 @@
           </a:p>
         </p:txBody>
       </p:sp>
+      <p:sp>
+        <p:nvSpPr>
+          <p:cNvPr id="2" name="TextBox 1">
+            <a:extLst>
+              <a:ext uri="{FF2B5EF4-FFF2-40B4-BE49-F238E27FC236}">
+                <a16:creationId xmlns:a16="http://schemas.microsoft.com/office/drawing/2014/main" id="{239B2597-CC15-9074-B7E8-1BEE8E9614AF}"/>
+              </a:ext>
+            </a:extLst>
+          </p:cNvPr>
+          <p:cNvSpPr txBox="1"/>
+          <p:nvPr/>
+        </p:nvSpPr>
+        <p:spPr>
+          <a:xfrm>
+            <a:off x="817366" y="6425532"/>
+            <a:ext cx="367408" cy="307777"/>
+          </a:xfrm>
+          <a:prstGeom prst="rect">
+            <a:avLst/>
+          </a:prstGeom>
+          <a:noFill/>
+        </p:spPr>
+        <p:txBody>
+          <a:bodyPr wrap="none" rtlCol="0">
+            <a:spAutoFit/>
+          </a:bodyPr>
+          <a:lstStyle/>
+          <a:p>
+            <a:r>
+              <a:rPr lang="en-US" sz="1400"/>
+              <a:t>13</a:t>
+            </a:r>
+          </a:p>
+        </p:txBody>
+      </p:sp>
+      <p:sp>
+        <p:nvSpPr>
+          <p:cNvPr id="3" name="TextBox 2">
+            <a:extLst>
+              <a:ext uri="{FF2B5EF4-FFF2-40B4-BE49-F238E27FC236}">
+                <a16:creationId xmlns:a16="http://schemas.microsoft.com/office/drawing/2014/main" id="{93B9C5A8-A050-7CEA-EFD4-6666B2E19EAC}"/>
+              </a:ext>
+            </a:extLst>
+          </p:cNvPr>
+          <p:cNvSpPr txBox="1"/>
+          <p:nvPr/>
+        </p:nvSpPr>
+        <p:spPr>
+          <a:xfrm>
+            <a:off x="3721580" y="5866851"/>
+            <a:ext cx="367408" cy="307777"/>
+          </a:xfrm>
+          <a:prstGeom prst="rect">
+            <a:avLst/>
+          </a:prstGeom>
+          <a:noFill/>
+        </p:spPr>
+        <p:txBody>
+          <a:bodyPr wrap="none" rtlCol="0">
+            <a:spAutoFit/>
+          </a:bodyPr>
+          <a:lstStyle/>
+          <a:p>
+            <a:r>
+              <a:rPr lang="en-US" sz="1400"/>
+              <a:t>14</a:t>
+            </a:r>
+          </a:p>
+        </p:txBody>
+      </p:sp>
     </p:spTree>
     <p:extLst>
       <p:ext uri="{BB962C8B-B14F-4D97-AF65-F5344CB8AC3E}">
@@ -16622,6 +17233,146 @@
           </a:p>
         </p:txBody>
       </p:sp>
+      <p:sp>
+        <p:nvSpPr>
+          <p:cNvPr id="2" name="TextBox 1">
+            <a:extLst>
+              <a:ext uri="{FF2B5EF4-FFF2-40B4-BE49-F238E27FC236}">
+                <a16:creationId xmlns:a16="http://schemas.microsoft.com/office/drawing/2014/main" id="{BB571F00-0DD1-D153-E38D-56460E5C5619}"/>
+              </a:ext>
+            </a:extLst>
+          </p:cNvPr>
+          <p:cNvSpPr txBox="1"/>
+          <p:nvPr/>
+        </p:nvSpPr>
+        <p:spPr>
+          <a:xfrm>
+            <a:off x="837623" y="615605"/>
+            <a:ext cx="367408" cy="307777"/>
+          </a:xfrm>
+          <a:prstGeom prst="rect">
+            <a:avLst/>
+          </a:prstGeom>
+          <a:noFill/>
+        </p:spPr>
+        <p:txBody>
+          <a:bodyPr wrap="none" rtlCol="0">
+            <a:spAutoFit/>
+          </a:bodyPr>
+          <a:lstStyle/>
+          <a:p>
+            <a:r>
+              <a:rPr lang="en-US" sz="1400"/>
+              <a:t>15</a:t>
+            </a:r>
+          </a:p>
+        </p:txBody>
+      </p:sp>
+      <p:sp>
+        <p:nvSpPr>
+          <p:cNvPr id="3" name="TextBox 2">
+            <a:extLst>
+              <a:ext uri="{FF2B5EF4-FFF2-40B4-BE49-F238E27FC236}">
+                <a16:creationId xmlns:a16="http://schemas.microsoft.com/office/drawing/2014/main" id="{AF76F268-3D40-04BB-4BF4-971E4798D1B2}"/>
+              </a:ext>
+            </a:extLst>
+          </p:cNvPr>
+          <p:cNvSpPr txBox="1"/>
+          <p:nvPr/>
+        </p:nvSpPr>
+        <p:spPr>
+          <a:xfrm>
+            <a:off x="3408726" y="2205181"/>
+            <a:ext cx="367408" cy="307777"/>
+          </a:xfrm>
+          <a:prstGeom prst="rect">
+            <a:avLst/>
+          </a:prstGeom>
+          <a:noFill/>
+        </p:spPr>
+        <p:txBody>
+          <a:bodyPr wrap="none" rtlCol="0">
+            <a:spAutoFit/>
+          </a:bodyPr>
+          <a:lstStyle/>
+          <a:p>
+            <a:r>
+              <a:rPr lang="en-US" sz="1400"/>
+              <a:t>16</a:t>
+            </a:r>
+          </a:p>
+        </p:txBody>
+      </p:sp>
+      <p:sp>
+        <p:nvSpPr>
+          <p:cNvPr id="26" name="TextBox 25">
+            <a:extLst>
+              <a:ext uri="{FF2B5EF4-FFF2-40B4-BE49-F238E27FC236}">
+                <a16:creationId xmlns:a16="http://schemas.microsoft.com/office/drawing/2014/main" id="{09E0E7A6-D013-FED1-B1C1-2E2640449BC6}"/>
+              </a:ext>
+            </a:extLst>
+          </p:cNvPr>
+          <p:cNvSpPr txBox="1"/>
+          <p:nvPr/>
+        </p:nvSpPr>
+        <p:spPr>
+          <a:xfrm>
+            <a:off x="2016320" y="3980723"/>
+            <a:ext cx="367408" cy="307777"/>
+          </a:xfrm>
+          <a:prstGeom prst="rect">
+            <a:avLst/>
+          </a:prstGeom>
+          <a:noFill/>
+        </p:spPr>
+        <p:txBody>
+          <a:bodyPr wrap="none" rtlCol="0">
+            <a:spAutoFit/>
+          </a:bodyPr>
+          <a:lstStyle/>
+          <a:p>
+            <a:r>
+              <a:rPr lang="en-US" sz="1400"/>
+              <a:t>17</a:t>
+            </a:r>
+          </a:p>
+        </p:txBody>
+      </p:sp>
+      <p:sp>
+        <p:nvSpPr>
+          <p:cNvPr id="42" name="TextBox 41">
+            <a:extLst>
+              <a:ext uri="{FF2B5EF4-FFF2-40B4-BE49-F238E27FC236}">
+                <a16:creationId xmlns:a16="http://schemas.microsoft.com/office/drawing/2014/main" id="{171A6598-5B5A-DF12-EF32-A52C68B49186}"/>
+              </a:ext>
+            </a:extLst>
+          </p:cNvPr>
+          <p:cNvSpPr txBox="1"/>
+          <p:nvPr/>
+        </p:nvSpPr>
+        <p:spPr>
+          <a:xfrm>
+            <a:off x="4204701" y="8339526"/>
+            <a:ext cx="367408" cy="307777"/>
+          </a:xfrm>
+          <a:prstGeom prst="rect">
+            <a:avLst/>
+          </a:prstGeom>
+          <a:noFill/>
+        </p:spPr>
+        <p:txBody>
+          <a:bodyPr wrap="none" rtlCol="0">
+            <a:spAutoFit/>
+          </a:bodyPr>
+          <a:lstStyle/>
+          <a:p>
+            <a:r>
+              <a:rPr lang="en-US" sz="1400"/>
+              <a:t>18</a:t>
+            </a:r>
+          </a:p>
+        </p:txBody>
+      </p:sp>
     </p:spTree>
     <p:extLst>
       <p:ext uri="{BB962C8B-B14F-4D97-AF65-F5344CB8AC3E}">
@@ -18236,6 +18987,76 @@
           </a:p>
         </p:txBody>
       </p:sp>
+      <p:sp>
+        <p:nvSpPr>
+          <p:cNvPr id="2" name="TextBox 1">
+            <a:extLst>
+              <a:ext uri="{FF2B5EF4-FFF2-40B4-BE49-F238E27FC236}">
+                <a16:creationId xmlns:a16="http://schemas.microsoft.com/office/drawing/2014/main" id="{C4D99DC4-E6F9-22B7-E2F4-CD350903E725}"/>
+              </a:ext>
+            </a:extLst>
+          </p:cNvPr>
+          <p:cNvSpPr txBox="1"/>
+          <p:nvPr/>
+        </p:nvSpPr>
+        <p:spPr>
+          <a:xfrm>
+            <a:off x="757732" y="6965859"/>
+            <a:ext cx="367408" cy="307777"/>
+          </a:xfrm>
+          <a:prstGeom prst="rect">
+            <a:avLst/>
+          </a:prstGeom>
+          <a:noFill/>
+        </p:spPr>
+        <p:txBody>
+          <a:bodyPr wrap="none" rtlCol="0">
+            <a:spAutoFit/>
+          </a:bodyPr>
+          <a:lstStyle/>
+          <a:p>
+            <a:r>
+              <a:rPr lang="en-US" sz="1400"/>
+              <a:t>19</a:t>
+            </a:r>
+          </a:p>
+        </p:txBody>
+      </p:sp>
+      <p:sp>
+        <p:nvSpPr>
+          <p:cNvPr id="3" name="TextBox 2">
+            <a:extLst>
+              <a:ext uri="{FF2B5EF4-FFF2-40B4-BE49-F238E27FC236}">
+                <a16:creationId xmlns:a16="http://schemas.microsoft.com/office/drawing/2014/main" id="{8AA2D633-BA78-E332-5EC9-50E2ED09069D}"/>
+              </a:ext>
+            </a:extLst>
+          </p:cNvPr>
+          <p:cNvSpPr txBox="1"/>
+          <p:nvPr/>
+        </p:nvSpPr>
+        <p:spPr>
+          <a:xfrm>
+            <a:off x="3687840" y="6381382"/>
+            <a:ext cx="367408" cy="307777"/>
+          </a:xfrm>
+          <a:prstGeom prst="rect">
+            <a:avLst/>
+          </a:prstGeom>
+          <a:noFill/>
+        </p:spPr>
+        <p:txBody>
+          <a:bodyPr wrap="none" rtlCol="0">
+            <a:spAutoFit/>
+          </a:bodyPr>
+          <a:lstStyle/>
+          <a:p>
+            <a:r>
+              <a:rPr lang="en-US" sz="1400"/>
+              <a:t>20</a:t>
+            </a:r>
+          </a:p>
+        </p:txBody>
+      </p:sp>
     </p:spTree>
     <p:extLst>
       <p:ext uri="{BB962C8B-B14F-4D97-AF65-F5344CB8AC3E}">
@@ -22304,6 +23125,181 @@
           </a:p>
         </p:txBody>
       </p:sp>
+      <p:sp>
+        <p:nvSpPr>
+          <p:cNvPr id="2" name="TextBox 1">
+            <a:extLst>
+              <a:ext uri="{FF2B5EF4-FFF2-40B4-BE49-F238E27FC236}">
+                <a16:creationId xmlns:a16="http://schemas.microsoft.com/office/drawing/2014/main" id="{2C97160E-8908-0E46-79DC-5F5FCCA30383}"/>
+              </a:ext>
+            </a:extLst>
+          </p:cNvPr>
+          <p:cNvSpPr txBox="1"/>
+          <p:nvPr/>
+        </p:nvSpPr>
+        <p:spPr>
+          <a:xfrm>
+            <a:off x="1119907" y="594056"/>
+            <a:ext cx="367408" cy="307777"/>
+          </a:xfrm>
+          <a:prstGeom prst="rect">
+            <a:avLst/>
+          </a:prstGeom>
+          <a:noFill/>
+        </p:spPr>
+        <p:txBody>
+          <a:bodyPr wrap="none" rtlCol="0">
+            <a:spAutoFit/>
+          </a:bodyPr>
+          <a:lstStyle/>
+          <a:p>
+            <a:r>
+              <a:rPr lang="en-US" sz="1400"/>
+              <a:t>21</a:t>
+            </a:r>
+          </a:p>
+        </p:txBody>
+      </p:sp>
+      <p:sp>
+        <p:nvSpPr>
+          <p:cNvPr id="3" name="TextBox 2">
+            <a:extLst>
+              <a:ext uri="{FF2B5EF4-FFF2-40B4-BE49-F238E27FC236}">
+                <a16:creationId xmlns:a16="http://schemas.microsoft.com/office/drawing/2014/main" id="{047426B0-C2CB-0287-D70B-54EE1429876F}"/>
+              </a:ext>
+            </a:extLst>
+          </p:cNvPr>
+          <p:cNvSpPr txBox="1"/>
+          <p:nvPr/>
+        </p:nvSpPr>
+        <p:spPr>
+          <a:xfrm>
+            <a:off x="4318740" y="1079646"/>
+            <a:ext cx="367408" cy="307777"/>
+          </a:xfrm>
+          <a:prstGeom prst="rect">
+            <a:avLst/>
+          </a:prstGeom>
+          <a:noFill/>
+        </p:spPr>
+        <p:txBody>
+          <a:bodyPr wrap="none" rtlCol="0">
+            <a:spAutoFit/>
+          </a:bodyPr>
+          <a:lstStyle/>
+          <a:p>
+            <a:r>
+              <a:rPr lang="en-US" sz="1400"/>
+              <a:t>22</a:t>
+            </a:r>
+          </a:p>
+        </p:txBody>
+      </p:sp>
+      <p:sp>
+        <p:nvSpPr>
+          <p:cNvPr id="36" name="TextBox 35">
+            <a:extLst>
+              <a:ext uri="{FF2B5EF4-FFF2-40B4-BE49-F238E27FC236}">
+                <a16:creationId xmlns:a16="http://schemas.microsoft.com/office/drawing/2014/main" id="{7A1CFE8B-152B-B203-2777-F670E0D0E7B1}"/>
+              </a:ext>
+            </a:extLst>
+          </p:cNvPr>
+          <p:cNvSpPr txBox="1"/>
+          <p:nvPr/>
+        </p:nvSpPr>
+        <p:spPr>
+          <a:xfrm>
+            <a:off x="5218580" y="1608203"/>
+            <a:ext cx="367408" cy="307777"/>
+          </a:xfrm>
+          <a:prstGeom prst="rect">
+            <a:avLst/>
+          </a:prstGeom>
+          <a:noFill/>
+        </p:spPr>
+        <p:txBody>
+          <a:bodyPr wrap="none" rtlCol="0">
+            <a:spAutoFit/>
+          </a:bodyPr>
+          <a:lstStyle/>
+          <a:p>
+            <a:r>
+              <a:rPr lang="en-US" sz="1400"/>
+              <a:t>23</a:t>
+            </a:r>
+          </a:p>
+        </p:txBody>
+      </p:sp>
+      <p:sp>
+        <p:nvSpPr>
+          <p:cNvPr id="40" name="TextBox 39">
+            <a:extLst>
+              <a:ext uri="{FF2B5EF4-FFF2-40B4-BE49-F238E27FC236}">
+                <a16:creationId xmlns:a16="http://schemas.microsoft.com/office/drawing/2014/main" id="{F07A1EF6-AB75-B86C-565A-A73A1A996221}"/>
+              </a:ext>
+            </a:extLst>
+          </p:cNvPr>
+          <p:cNvSpPr txBox="1"/>
+          <p:nvPr/>
+        </p:nvSpPr>
+        <p:spPr>
+          <a:xfrm>
+            <a:off x="2274654" y="8724259"/>
+            <a:ext cx="367408" cy="307777"/>
+          </a:xfrm>
+          <a:prstGeom prst="rect">
+            <a:avLst/>
+          </a:prstGeom>
+          <a:noFill/>
+        </p:spPr>
+        <p:txBody>
+          <a:bodyPr wrap="none" rtlCol="0">
+            <a:spAutoFit/>
+          </a:bodyPr>
+          <a:lstStyle/>
+          <a:p>
+            <a:r>
+              <a:rPr lang="en-US" sz="1400"/>
+              <a:t>24</a:t>
+            </a:r>
+          </a:p>
+        </p:txBody>
+      </p:sp>
+      <p:sp>
+        <p:nvSpPr>
+          <p:cNvPr id="41" name="TextBox 40">
+            <a:extLst>
+              <a:ext uri="{FF2B5EF4-FFF2-40B4-BE49-F238E27FC236}">
+                <a16:creationId xmlns:a16="http://schemas.microsoft.com/office/drawing/2014/main" id="{B90E6FFB-67B3-481F-935A-95D40CE1C7AD}"/>
+              </a:ext>
+            </a:extLst>
+          </p:cNvPr>
+          <p:cNvSpPr txBox="1"/>
+          <p:nvPr/>
+        </p:nvSpPr>
+        <p:spPr>
+          <a:xfrm>
+            <a:off x="5340334" y="7615006"/>
+            <a:ext cx="367408" cy="307777"/>
+          </a:xfrm>
+          <a:prstGeom prst="rect">
+            <a:avLst/>
+          </a:prstGeom>
+          <a:noFill/>
+        </p:spPr>
+        <p:txBody>
+          <a:bodyPr wrap="none" rtlCol="0">
+            <a:spAutoFit/>
+          </a:bodyPr>
+          <a:lstStyle/>
+          <a:p>
+            <a:r>
+              <a:rPr lang="en-US" sz="1400"/>
+              <a:t>25</a:t>
+            </a:r>
+          </a:p>
+        </p:txBody>
+      </p:sp>
     </p:spTree>
     <p:extLst>
       <p:ext uri="{BB962C8B-B14F-4D97-AF65-F5344CB8AC3E}">
@@ -23735,6 +24731,41 @@
           <a:p>
             <a:pPr algn="ctr"/>
             <a:endParaRPr lang="en-US"/>
+          </a:p>
+        </p:txBody>
+      </p:sp>
+      <p:sp>
+        <p:nvSpPr>
+          <p:cNvPr id="2" name="TextBox 1">
+            <a:extLst>
+              <a:ext uri="{FF2B5EF4-FFF2-40B4-BE49-F238E27FC236}">
+                <a16:creationId xmlns:a16="http://schemas.microsoft.com/office/drawing/2014/main" id="{9F50ECDE-F3B0-DFAE-29A8-F4EC3163FD45}"/>
+              </a:ext>
+            </a:extLst>
+          </p:cNvPr>
+          <p:cNvSpPr txBox="1"/>
+          <p:nvPr/>
+        </p:nvSpPr>
+        <p:spPr>
+          <a:xfrm>
+            <a:off x="2322999" y="1103076"/>
+            <a:ext cx="367408" cy="307777"/>
+          </a:xfrm>
+          <a:prstGeom prst="rect">
+            <a:avLst/>
+          </a:prstGeom>
+          <a:noFill/>
+        </p:spPr>
+        <p:txBody>
+          <a:bodyPr wrap="none" rtlCol="0">
+            <a:spAutoFit/>
+          </a:bodyPr>
+          <a:lstStyle/>
+          <a:p>
+            <a:r>
+              <a:rPr lang="en-US" sz="1400"/>
+              <a:t>26</a:t>
+            </a:r>
           </a:p>
         </p:txBody>
       </p:sp>

</xml_diff>